<commit_message>
Update the 'pipelining' diagram
</commit_message>
<xml_diff>
--- a/assets/2019-11-19-speed-up-trt-ssd/pipelining.pptx
+++ b/assets/2019-11-19-speed-up-trt-ssd/pipelining.pptx
@@ -288,7 +288,7 @@
           <a:p>
             <a:fld id="{9EB954C2-74F8-43BE-B279-734065EF9A56}" type="datetimeFigureOut">
               <a:rPr lang="zh-TW" altLang="en-US" smtClean="0"/>
-              <a:t>2019/11/19</a:t>
+              <a:t>2019/11/28</a:t>
             </a:fld>
             <a:endParaRPr lang="zh-TW" altLang="en-US"/>
           </a:p>
@@ -458,7 +458,7 @@
           <a:p>
             <a:fld id="{9EB954C2-74F8-43BE-B279-734065EF9A56}" type="datetimeFigureOut">
               <a:rPr lang="zh-TW" altLang="en-US" smtClean="0"/>
-              <a:t>2019/11/19</a:t>
+              <a:t>2019/11/28</a:t>
             </a:fld>
             <a:endParaRPr lang="zh-TW" altLang="en-US"/>
           </a:p>
@@ -638,7 +638,7 @@
           <a:p>
             <a:fld id="{9EB954C2-74F8-43BE-B279-734065EF9A56}" type="datetimeFigureOut">
               <a:rPr lang="zh-TW" altLang="en-US" smtClean="0"/>
-              <a:t>2019/11/19</a:t>
+              <a:t>2019/11/28</a:t>
             </a:fld>
             <a:endParaRPr lang="zh-TW" altLang="en-US"/>
           </a:p>
@@ -808,7 +808,7 @@
           <a:p>
             <a:fld id="{9EB954C2-74F8-43BE-B279-734065EF9A56}" type="datetimeFigureOut">
               <a:rPr lang="zh-TW" altLang="en-US" smtClean="0"/>
-              <a:t>2019/11/19</a:t>
+              <a:t>2019/11/28</a:t>
             </a:fld>
             <a:endParaRPr lang="zh-TW" altLang="en-US"/>
           </a:p>
@@ -1054,7 +1054,7 @@
           <a:p>
             <a:fld id="{9EB954C2-74F8-43BE-B279-734065EF9A56}" type="datetimeFigureOut">
               <a:rPr lang="zh-TW" altLang="en-US" smtClean="0"/>
-              <a:t>2019/11/19</a:t>
+              <a:t>2019/11/28</a:t>
             </a:fld>
             <a:endParaRPr lang="zh-TW" altLang="en-US"/>
           </a:p>
@@ -1342,7 +1342,7 @@
           <a:p>
             <a:fld id="{9EB954C2-74F8-43BE-B279-734065EF9A56}" type="datetimeFigureOut">
               <a:rPr lang="zh-TW" altLang="en-US" smtClean="0"/>
-              <a:t>2019/11/19</a:t>
+              <a:t>2019/11/28</a:t>
             </a:fld>
             <a:endParaRPr lang="zh-TW" altLang="en-US"/>
           </a:p>
@@ -1764,7 +1764,7 @@
           <a:p>
             <a:fld id="{9EB954C2-74F8-43BE-B279-734065EF9A56}" type="datetimeFigureOut">
               <a:rPr lang="zh-TW" altLang="en-US" smtClean="0"/>
-              <a:t>2019/11/19</a:t>
+              <a:t>2019/11/28</a:t>
             </a:fld>
             <a:endParaRPr lang="zh-TW" altLang="en-US"/>
           </a:p>
@@ -1882,7 +1882,7 @@
           <a:p>
             <a:fld id="{9EB954C2-74F8-43BE-B279-734065EF9A56}" type="datetimeFigureOut">
               <a:rPr lang="zh-TW" altLang="en-US" smtClean="0"/>
-              <a:t>2019/11/19</a:t>
+              <a:t>2019/11/28</a:t>
             </a:fld>
             <a:endParaRPr lang="zh-TW" altLang="en-US"/>
           </a:p>
@@ -1977,7 +1977,7 @@
           <a:p>
             <a:fld id="{9EB954C2-74F8-43BE-B279-734065EF9A56}" type="datetimeFigureOut">
               <a:rPr lang="zh-TW" altLang="en-US" smtClean="0"/>
-              <a:t>2019/11/19</a:t>
+              <a:t>2019/11/28</a:t>
             </a:fld>
             <a:endParaRPr lang="zh-TW" altLang="en-US"/>
           </a:p>
@@ -2254,7 +2254,7 @@
           <a:p>
             <a:fld id="{9EB954C2-74F8-43BE-B279-734065EF9A56}" type="datetimeFigureOut">
               <a:rPr lang="zh-TW" altLang="en-US" smtClean="0"/>
-              <a:t>2019/11/19</a:t>
+              <a:t>2019/11/28</a:t>
             </a:fld>
             <a:endParaRPr lang="zh-TW" altLang="en-US"/>
           </a:p>
@@ -2507,7 +2507,7 @@
           <a:p>
             <a:fld id="{9EB954C2-74F8-43BE-B279-734065EF9A56}" type="datetimeFigureOut">
               <a:rPr lang="zh-TW" altLang="en-US" smtClean="0"/>
-              <a:t>2019/11/19</a:t>
+              <a:t>2019/11/28</a:t>
             </a:fld>
             <a:endParaRPr lang="zh-TW" altLang="en-US"/>
           </a:p>
@@ -2720,7 +2720,7 @@
           <a:p>
             <a:fld id="{9EB954C2-74F8-43BE-B279-734065EF9A56}" type="datetimeFigureOut">
               <a:rPr lang="zh-TW" altLang="en-US" smtClean="0"/>
-              <a:t>2019/11/19</a:t>
+              <a:t>2019/11/28</a:t>
             </a:fld>
             <a:endParaRPr lang="zh-TW" altLang="en-US"/>
           </a:p>
@@ -3103,7 +3103,7 @@
         </p:nvSpPr>
         <p:spPr>
           <a:xfrm>
-            <a:off x="1475656" y="2708920"/>
+            <a:off x="1259632" y="2956882"/>
             <a:ext cx="1800200" cy="720080"/>
           </a:xfrm>
           <a:prstGeom prst="rect">
@@ -3161,7 +3161,7 @@
         </p:nvSpPr>
         <p:spPr>
           <a:xfrm>
-            <a:off x="3275856" y="2708920"/>
+            <a:off x="3059832" y="2956882"/>
             <a:ext cx="1800200" cy="720080"/>
           </a:xfrm>
           <a:prstGeom prst="rect">
@@ -3219,7 +3219,7 @@
         </p:nvSpPr>
         <p:spPr>
           <a:xfrm>
-            <a:off x="5076056" y="2708920"/>
+            <a:off x="4860032" y="2956882"/>
             <a:ext cx="1800200" cy="720080"/>
           </a:xfrm>
           <a:prstGeom prst="rect">
@@ -3277,7 +3277,7 @@
         </p:nvSpPr>
         <p:spPr>
           <a:xfrm>
-            <a:off x="6876256" y="2708920"/>
+            <a:off x="6660232" y="2956882"/>
             <a:ext cx="1800200" cy="720080"/>
           </a:xfrm>
           <a:prstGeom prst="rect">
@@ -3335,8 +3335,8 @@
         </p:nvSpPr>
         <p:spPr>
           <a:xfrm>
-            <a:off x="3419872" y="4149080"/>
-            <a:ext cx="1152128" cy="720080"/>
+            <a:off x="3203848" y="4397042"/>
+            <a:ext cx="1080120" cy="720080"/>
           </a:xfrm>
           <a:prstGeom prst="rect">
             <a:avLst/>
@@ -3393,8 +3393,8 @@
         </p:nvSpPr>
         <p:spPr>
           <a:xfrm>
-            <a:off x="5220072" y="4149080"/>
-            <a:ext cx="1152128" cy="720080"/>
+            <a:off x="5004048" y="4397042"/>
+            <a:ext cx="1080120" cy="720080"/>
           </a:xfrm>
           <a:prstGeom prst="rect">
             <a:avLst/>
@@ -3451,8 +3451,8 @@
         </p:nvSpPr>
         <p:spPr>
           <a:xfrm>
-            <a:off x="7020272" y="4149080"/>
-            <a:ext cx="1152128" cy="720080"/>
+            <a:off x="6804248" y="4397042"/>
+            <a:ext cx="1080120" cy="720080"/>
           </a:xfrm>
           <a:prstGeom prst="rect">
             <a:avLst/>
@@ -3509,7 +3509,7 @@
         </p:nvCxnSpPr>
         <p:spPr>
           <a:xfrm>
-            <a:off x="3275856" y="3429000"/>
+            <a:off x="3059832" y="3676962"/>
             <a:ext cx="144016" cy="720080"/>
           </a:xfrm>
           <a:prstGeom prst="straightConnector1">
@@ -3545,7 +3545,7 @@
         </p:nvCxnSpPr>
         <p:spPr>
           <a:xfrm>
-            <a:off x="5076056" y="3429000"/>
+            <a:off x="4860032" y="3676962"/>
             <a:ext cx="144016" cy="720080"/>
           </a:xfrm>
           <a:prstGeom prst="straightConnector1">
@@ -3581,7 +3581,7 @@
         </p:nvCxnSpPr>
         <p:spPr>
           <a:xfrm>
-            <a:off x="6876256" y="3429000"/>
+            <a:off x="6660232" y="3676962"/>
             <a:ext cx="144016" cy="720080"/>
           </a:xfrm>
           <a:prstGeom prst="straightConnector1">
@@ -3620,8 +3620,8 @@
         </p:nvCxnSpPr>
         <p:spPr>
           <a:xfrm>
-            <a:off x="4572000" y="4509120"/>
-            <a:ext cx="648072" cy="0"/>
+            <a:off x="4283968" y="4757082"/>
+            <a:ext cx="720080" cy="0"/>
           </a:xfrm>
           <a:prstGeom prst="line">
             <a:avLst/>
@@ -3659,8 +3659,8 @@
         </p:nvCxnSpPr>
         <p:spPr>
           <a:xfrm>
-            <a:off x="6372200" y="4509120"/>
-            <a:ext cx="648072" cy="0"/>
+            <a:off x="6084168" y="4757082"/>
+            <a:ext cx="720080" cy="0"/>
           </a:xfrm>
           <a:prstGeom prst="line">
             <a:avLst/>
@@ -3697,8 +3697,8 @@
         </p:nvCxnSpPr>
         <p:spPr>
           <a:xfrm>
-            <a:off x="8172400" y="4509120"/>
-            <a:ext cx="648072" cy="0"/>
+            <a:off x="7884368" y="4757082"/>
+            <a:ext cx="720080" cy="0"/>
           </a:xfrm>
           <a:prstGeom prst="line">
             <a:avLst/>
@@ -3735,7 +3735,7 @@
         </p:nvCxnSpPr>
         <p:spPr>
           <a:xfrm>
-            <a:off x="1475656" y="4509120"/>
+            <a:off x="1259632" y="4757082"/>
             <a:ext cx="1944216" cy="0"/>
           </a:xfrm>
           <a:prstGeom prst="line">
@@ -3771,7 +3771,7 @@
         </p:nvSpPr>
         <p:spPr>
           <a:xfrm>
-            <a:off x="3419872" y="3573016"/>
+            <a:off x="3131840" y="3676962"/>
             <a:ext cx="936104" cy="369332"/>
           </a:xfrm>
           <a:prstGeom prst="rect">
@@ -3813,7 +3813,7 @@
         </p:nvSpPr>
         <p:spPr>
           <a:xfrm>
-            <a:off x="5220072" y="3573016"/>
+            <a:off x="4932040" y="3676962"/>
             <a:ext cx="936104" cy="369332"/>
           </a:xfrm>
           <a:prstGeom prst="rect">
@@ -3855,7 +3855,7 @@
         </p:nvSpPr>
         <p:spPr>
           <a:xfrm>
-            <a:off x="7020272" y="3573016"/>
+            <a:off x="6732240" y="3676962"/>
             <a:ext cx="936104" cy="369332"/>
           </a:xfrm>
           <a:prstGeom prst="rect">
@@ -3897,7 +3897,7 @@
         </p:nvSpPr>
         <p:spPr>
           <a:xfrm>
-            <a:off x="323528" y="2708920"/>
+            <a:off x="107504" y="2956882"/>
             <a:ext cx="1152128" cy="707886"/>
           </a:xfrm>
           <a:prstGeom prst="rect">
@@ -3944,7 +3944,7 @@
         </p:nvSpPr>
         <p:spPr>
           <a:xfrm>
-            <a:off x="323528" y="4161274"/>
+            <a:off x="107504" y="4409236"/>
             <a:ext cx="1152128" cy="707886"/>
           </a:xfrm>
           <a:prstGeom prst="rect">
@@ -3977,6 +3977,589 @@
               <a:t>Thread</a:t>
             </a:r>
             <a:endParaRPr lang="zh-TW" altLang="en-US" sz="2000" b="1" dirty="0">
+              <a:latin typeface="微軟正黑體" panose="020B0604030504040204" pitchFamily="34" charset="-120"/>
+              <a:ea typeface="微軟正黑體" panose="020B0604030504040204" pitchFamily="34" charset="-120"/>
+            </a:endParaRPr>
+          </a:p>
+        </p:txBody>
+      </p:sp>
+      <p:sp>
+        <p:nvSpPr>
+          <p:cNvPr id="21" name="文字方塊 20"/>
+          <p:cNvSpPr txBox="1"/>
+          <p:nvPr/>
+        </p:nvSpPr>
+        <p:spPr>
+          <a:xfrm>
+            <a:off x="1331640" y="4387750"/>
+            <a:ext cx="648072" cy="369332"/>
+          </a:xfrm>
+          <a:prstGeom prst="rect">
+            <a:avLst/>
+          </a:prstGeom>
+          <a:noFill/>
+        </p:spPr>
+        <p:txBody>
+          <a:bodyPr wrap="square" rtlCol="0">
+            <a:spAutoFit/>
+          </a:bodyPr>
+          <a:lstStyle/>
+          <a:p>
+            <a:r>
+              <a:rPr lang="en-US" altLang="zh-TW" b="1" dirty="0" smtClean="0">
+                <a:solidFill>
+                  <a:schemeClr val="accent1"/>
+                </a:solidFill>
+                <a:latin typeface="微軟正黑體" panose="020B0604030504040204" pitchFamily="34" charset="-120"/>
+                <a:ea typeface="微軟正黑體" panose="020B0604030504040204" pitchFamily="34" charset="-120"/>
+              </a:rPr>
+              <a:t>wait</a:t>
+            </a:r>
+            <a:endParaRPr lang="zh-TW" altLang="en-US" b="1" dirty="0">
+              <a:solidFill>
+                <a:schemeClr val="accent1"/>
+              </a:solidFill>
+              <a:latin typeface="微軟正黑體" panose="020B0604030504040204" pitchFamily="34" charset="-120"/>
+              <a:ea typeface="微軟正黑體" panose="020B0604030504040204" pitchFamily="34" charset="-120"/>
+            </a:endParaRPr>
+          </a:p>
+        </p:txBody>
+      </p:sp>
+      <p:sp>
+        <p:nvSpPr>
+          <p:cNvPr id="22" name="文字方塊 21"/>
+          <p:cNvSpPr txBox="1"/>
+          <p:nvPr/>
+        </p:nvSpPr>
+        <p:spPr>
+          <a:xfrm>
+            <a:off x="4283968" y="4387750"/>
+            <a:ext cx="648072" cy="369332"/>
+          </a:xfrm>
+          <a:prstGeom prst="rect">
+            <a:avLst/>
+          </a:prstGeom>
+          <a:noFill/>
+        </p:spPr>
+        <p:txBody>
+          <a:bodyPr wrap="square" rtlCol="0">
+            <a:spAutoFit/>
+          </a:bodyPr>
+          <a:lstStyle/>
+          <a:p>
+            <a:r>
+              <a:rPr lang="en-US" altLang="zh-TW" b="1" dirty="0" smtClean="0">
+                <a:solidFill>
+                  <a:schemeClr val="accent1"/>
+                </a:solidFill>
+                <a:latin typeface="微軟正黑體" panose="020B0604030504040204" pitchFamily="34" charset="-120"/>
+                <a:ea typeface="微軟正黑體" panose="020B0604030504040204" pitchFamily="34" charset="-120"/>
+              </a:rPr>
+              <a:t>wait</a:t>
+            </a:r>
+            <a:endParaRPr lang="zh-TW" altLang="en-US" b="1" dirty="0">
+              <a:solidFill>
+                <a:schemeClr val="accent1"/>
+              </a:solidFill>
+              <a:latin typeface="微軟正黑體" panose="020B0604030504040204" pitchFamily="34" charset="-120"/>
+              <a:ea typeface="微軟正黑體" panose="020B0604030504040204" pitchFamily="34" charset="-120"/>
+            </a:endParaRPr>
+          </a:p>
+        </p:txBody>
+      </p:sp>
+      <p:sp>
+        <p:nvSpPr>
+          <p:cNvPr id="28" name="文字方塊 27"/>
+          <p:cNvSpPr txBox="1"/>
+          <p:nvPr/>
+        </p:nvSpPr>
+        <p:spPr>
+          <a:xfrm>
+            <a:off x="6084168" y="4397042"/>
+            <a:ext cx="648072" cy="369332"/>
+          </a:xfrm>
+          <a:prstGeom prst="rect">
+            <a:avLst/>
+          </a:prstGeom>
+          <a:noFill/>
+        </p:spPr>
+        <p:txBody>
+          <a:bodyPr wrap="square" rtlCol="0">
+            <a:spAutoFit/>
+          </a:bodyPr>
+          <a:lstStyle/>
+          <a:p>
+            <a:r>
+              <a:rPr lang="en-US" altLang="zh-TW" b="1" dirty="0" smtClean="0">
+                <a:solidFill>
+                  <a:schemeClr val="accent1"/>
+                </a:solidFill>
+                <a:latin typeface="微軟正黑體" panose="020B0604030504040204" pitchFamily="34" charset="-120"/>
+                <a:ea typeface="微軟正黑體" panose="020B0604030504040204" pitchFamily="34" charset="-120"/>
+              </a:rPr>
+              <a:t>wait</a:t>
+            </a:r>
+            <a:endParaRPr lang="zh-TW" altLang="en-US" b="1" dirty="0">
+              <a:solidFill>
+                <a:schemeClr val="accent1"/>
+              </a:solidFill>
+              <a:latin typeface="微軟正黑體" panose="020B0604030504040204" pitchFamily="34" charset="-120"/>
+              <a:ea typeface="微軟正黑體" panose="020B0604030504040204" pitchFamily="34" charset="-120"/>
+            </a:endParaRPr>
+          </a:p>
+        </p:txBody>
+      </p:sp>
+      <p:sp>
+        <p:nvSpPr>
+          <p:cNvPr id="29" name="文字方塊 28"/>
+          <p:cNvSpPr txBox="1"/>
+          <p:nvPr/>
+        </p:nvSpPr>
+        <p:spPr>
+          <a:xfrm>
+            <a:off x="7884368" y="4387750"/>
+            <a:ext cx="648072" cy="369332"/>
+          </a:xfrm>
+          <a:prstGeom prst="rect">
+            <a:avLst/>
+          </a:prstGeom>
+          <a:noFill/>
+        </p:spPr>
+        <p:txBody>
+          <a:bodyPr wrap="square" rtlCol="0">
+            <a:spAutoFit/>
+          </a:bodyPr>
+          <a:lstStyle/>
+          <a:p>
+            <a:r>
+              <a:rPr lang="en-US" altLang="zh-TW" b="1" dirty="0" smtClean="0">
+                <a:solidFill>
+                  <a:schemeClr val="accent1"/>
+                </a:solidFill>
+                <a:latin typeface="微軟正黑體" panose="020B0604030504040204" pitchFamily="34" charset="-120"/>
+                <a:ea typeface="微軟正黑體" panose="020B0604030504040204" pitchFamily="34" charset="-120"/>
+              </a:rPr>
+              <a:t>wait</a:t>
+            </a:r>
+            <a:endParaRPr lang="zh-TW" altLang="en-US" b="1" dirty="0">
+              <a:solidFill>
+                <a:schemeClr val="accent1"/>
+              </a:solidFill>
+              <a:latin typeface="微軟正黑體" panose="020B0604030504040204" pitchFamily="34" charset="-120"/>
+              <a:ea typeface="微軟正黑體" panose="020B0604030504040204" pitchFamily="34" charset="-120"/>
+            </a:endParaRPr>
+          </a:p>
+        </p:txBody>
+      </p:sp>
+      <p:sp>
+        <p:nvSpPr>
+          <p:cNvPr id="30" name="矩形 29"/>
+          <p:cNvSpPr/>
+          <p:nvPr/>
+        </p:nvSpPr>
+        <p:spPr>
+          <a:xfrm>
+            <a:off x="1259632" y="908720"/>
+            <a:ext cx="1800200" cy="720080"/>
+          </a:xfrm>
+          <a:prstGeom prst="rect">
+            <a:avLst/>
+          </a:prstGeom>
+        </p:spPr>
+        <p:style>
+          <a:lnRef idx="2">
+            <a:schemeClr val="dk1"/>
+          </a:lnRef>
+          <a:fillRef idx="1">
+            <a:schemeClr val="lt1"/>
+          </a:fillRef>
+          <a:effectRef idx="0">
+            <a:schemeClr val="dk1"/>
+          </a:effectRef>
+          <a:fontRef idx="minor">
+            <a:schemeClr val="dk1"/>
+          </a:fontRef>
+        </p:style>
+        <p:txBody>
+          <a:bodyPr rtlCol="0" anchor="ctr"/>
+          <a:lstStyle/>
+          <a:p>
+            <a:pPr algn="ctr"/>
+            <a:r>
+              <a:rPr lang="en-US" altLang="zh-TW" dirty="0" smtClean="0">
+                <a:latin typeface="微軟正黑體" panose="020B0604030504040204" pitchFamily="34" charset="-120"/>
+                <a:ea typeface="微軟正黑體" panose="020B0604030504040204" pitchFamily="34" charset="-120"/>
+              </a:rPr>
+              <a:t>Detect</a:t>
+            </a:r>
+          </a:p>
+          <a:p>
+            <a:pPr algn="ctr"/>
+            <a:r>
+              <a:rPr lang="en-US" altLang="zh-TW" dirty="0" smtClean="0">
+                <a:latin typeface="微軟正黑體" panose="020B0604030504040204" pitchFamily="34" charset="-120"/>
+                <a:ea typeface="微軟正黑體" panose="020B0604030504040204" pitchFamily="34" charset="-120"/>
+              </a:rPr>
+              <a:t>Frame #1</a:t>
+            </a:r>
+            <a:endParaRPr lang="zh-TW" altLang="en-US" dirty="0">
+              <a:latin typeface="微軟正黑體" panose="020B0604030504040204" pitchFamily="34" charset="-120"/>
+              <a:ea typeface="微軟正黑體" panose="020B0604030504040204" pitchFamily="34" charset="-120"/>
+            </a:endParaRPr>
+          </a:p>
+        </p:txBody>
+      </p:sp>
+      <p:sp>
+        <p:nvSpPr>
+          <p:cNvPr id="31" name="矩形 30"/>
+          <p:cNvSpPr/>
+          <p:nvPr/>
+        </p:nvSpPr>
+        <p:spPr>
+          <a:xfrm>
+            <a:off x="4139952" y="908720"/>
+            <a:ext cx="1800200" cy="720080"/>
+          </a:xfrm>
+          <a:prstGeom prst="rect">
+            <a:avLst/>
+          </a:prstGeom>
+        </p:spPr>
+        <p:style>
+          <a:lnRef idx="2">
+            <a:schemeClr val="dk1"/>
+          </a:lnRef>
+          <a:fillRef idx="1">
+            <a:schemeClr val="lt1"/>
+          </a:fillRef>
+          <a:effectRef idx="0">
+            <a:schemeClr val="dk1"/>
+          </a:effectRef>
+          <a:fontRef idx="minor">
+            <a:schemeClr val="dk1"/>
+          </a:fontRef>
+        </p:style>
+        <p:txBody>
+          <a:bodyPr rtlCol="0" anchor="ctr"/>
+          <a:lstStyle/>
+          <a:p>
+            <a:pPr algn="ctr"/>
+            <a:r>
+              <a:rPr lang="en-US" altLang="zh-TW" dirty="0" smtClean="0">
+                <a:latin typeface="微軟正黑體" panose="020B0604030504040204" pitchFamily="34" charset="-120"/>
+                <a:ea typeface="微軟正黑體" panose="020B0604030504040204" pitchFamily="34" charset="-120"/>
+              </a:rPr>
+              <a:t>Detect</a:t>
+            </a:r>
+          </a:p>
+          <a:p>
+            <a:pPr algn="ctr"/>
+            <a:r>
+              <a:rPr lang="en-US" altLang="zh-TW" dirty="0" smtClean="0">
+                <a:latin typeface="微軟正黑體" panose="020B0604030504040204" pitchFamily="34" charset="-120"/>
+                <a:ea typeface="微軟正黑體" panose="020B0604030504040204" pitchFamily="34" charset="-120"/>
+              </a:rPr>
+              <a:t>Frame #2</a:t>
+            </a:r>
+            <a:endParaRPr lang="zh-TW" altLang="en-US" dirty="0">
+              <a:latin typeface="微軟正黑體" panose="020B0604030504040204" pitchFamily="34" charset="-120"/>
+              <a:ea typeface="微軟正黑體" panose="020B0604030504040204" pitchFamily="34" charset="-120"/>
+            </a:endParaRPr>
+          </a:p>
+        </p:txBody>
+      </p:sp>
+      <p:sp>
+        <p:nvSpPr>
+          <p:cNvPr id="32" name="矩形 31"/>
+          <p:cNvSpPr/>
+          <p:nvPr/>
+        </p:nvSpPr>
+        <p:spPr>
+          <a:xfrm>
+            <a:off x="7020272" y="908720"/>
+            <a:ext cx="1800200" cy="720080"/>
+          </a:xfrm>
+          <a:prstGeom prst="rect">
+            <a:avLst/>
+          </a:prstGeom>
+        </p:spPr>
+        <p:style>
+          <a:lnRef idx="2">
+            <a:schemeClr val="dk1"/>
+          </a:lnRef>
+          <a:fillRef idx="1">
+            <a:schemeClr val="lt1"/>
+          </a:fillRef>
+          <a:effectRef idx="0">
+            <a:schemeClr val="dk1"/>
+          </a:effectRef>
+          <a:fontRef idx="minor">
+            <a:schemeClr val="dk1"/>
+          </a:fontRef>
+        </p:style>
+        <p:txBody>
+          <a:bodyPr rtlCol="0" anchor="ctr"/>
+          <a:lstStyle/>
+          <a:p>
+            <a:pPr algn="ctr"/>
+            <a:r>
+              <a:rPr lang="en-US" altLang="zh-TW" dirty="0" smtClean="0">
+                <a:latin typeface="微軟正黑體" panose="020B0604030504040204" pitchFamily="34" charset="-120"/>
+                <a:ea typeface="微軟正黑體" panose="020B0604030504040204" pitchFamily="34" charset="-120"/>
+              </a:rPr>
+              <a:t>Detect</a:t>
+            </a:r>
+          </a:p>
+          <a:p>
+            <a:pPr algn="ctr"/>
+            <a:r>
+              <a:rPr lang="en-US" altLang="zh-TW" dirty="0" smtClean="0">
+                <a:latin typeface="微軟正黑體" panose="020B0604030504040204" pitchFamily="34" charset="-120"/>
+                <a:ea typeface="微軟正黑體" panose="020B0604030504040204" pitchFamily="34" charset="-120"/>
+              </a:rPr>
+              <a:t>Frame #3</a:t>
+            </a:r>
+            <a:endParaRPr lang="zh-TW" altLang="en-US" dirty="0">
+              <a:latin typeface="微軟正黑體" panose="020B0604030504040204" pitchFamily="34" charset="-120"/>
+              <a:ea typeface="微軟正黑體" panose="020B0604030504040204" pitchFamily="34" charset="-120"/>
+            </a:endParaRPr>
+          </a:p>
+        </p:txBody>
+      </p:sp>
+      <p:sp>
+        <p:nvSpPr>
+          <p:cNvPr id="34" name="文字方塊 33"/>
+          <p:cNvSpPr txBox="1"/>
+          <p:nvPr/>
+        </p:nvSpPr>
+        <p:spPr>
+          <a:xfrm>
+            <a:off x="107504" y="920914"/>
+            <a:ext cx="1152128" cy="707886"/>
+          </a:xfrm>
+          <a:prstGeom prst="rect">
+            <a:avLst/>
+          </a:prstGeom>
+          <a:noFill/>
+        </p:spPr>
+        <p:txBody>
+          <a:bodyPr wrap="square" rtlCol="0">
+            <a:spAutoFit/>
+          </a:bodyPr>
+          <a:lstStyle/>
+          <a:p>
+            <a:pPr algn="ctr"/>
+            <a:r>
+              <a:rPr lang="en-US" altLang="zh-TW" sz="2000" b="1" dirty="0" smtClean="0">
+                <a:latin typeface="微軟正黑體" panose="020B0604030504040204" pitchFamily="34" charset="-120"/>
+                <a:ea typeface="微軟正黑體" panose="020B0604030504040204" pitchFamily="34" charset="-120"/>
+              </a:rPr>
+              <a:t>Single</a:t>
+            </a:r>
+            <a:endParaRPr lang="en-US" altLang="zh-TW" sz="2000" b="1" dirty="0" smtClean="0">
+              <a:latin typeface="微軟正黑體" panose="020B0604030504040204" pitchFamily="34" charset="-120"/>
+              <a:ea typeface="微軟正黑體" panose="020B0604030504040204" pitchFamily="34" charset="-120"/>
+            </a:endParaRPr>
+          </a:p>
+          <a:p>
+            <a:pPr algn="ctr"/>
+            <a:r>
+              <a:rPr lang="en-US" altLang="zh-TW" sz="2000" b="1" dirty="0" smtClean="0">
+                <a:latin typeface="微軟正黑體" panose="020B0604030504040204" pitchFamily="34" charset="-120"/>
+                <a:ea typeface="微軟正黑體" panose="020B0604030504040204" pitchFamily="34" charset="-120"/>
+              </a:rPr>
+              <a:t>Thread</a:t>
+            </a:r>
+            <a:endParaRPr lang="zh-TW" altLang="en-US" sz="2000" b="1" dirty="0">
+              <a:latin typeface="微軟正黑體" panose="020B0604030504040204" pitchFamily="34" charset="-120"/>
+              <a:ea typeface="微軟正黑體" panose="020B0604030504040204" pitchFamily="34" charset="-120"/>
+            </a:endParaRPr>
+          </a:p>
+        </p:txBody>
+      </p:sp>
+      <p:sp>
+        <p:nvSpPr>
+          <p:cNvPr id="35" name="文字方塊 34"/>
+          <p:cNvSpPr txBox="1"/>
+          <p:nvPr/>
+        </p:nvSpPr>
+        <p:spPr>
+          <a:xfrm>
+            <a:off x="2843808" y="1876762"/>
+            <a:ext cx="3456384" cy="400110"/>
+          </a:xfrm>
+          <a:prstGeom prst="rect">
+            <a:avLst/>
+          </a:prstGeom>
+          <a:noFill/>
+        </p:spPr>
+        <p:txBody>
+          <a:bodyPr wrap="square" rtlCol="0">
+            <a:spAutoFit/>
+          </a:bodyPr>
+          <a:lstStyle/>
+          <a:p>
+            <a:pPr algn="ctr"/>
+            <a:r>
+              <a:rPr lang="en-US" altLang="zh-TW" sz="2000" b="1" dirty="0" smtClean="0">
+                <a:latin typeface="微軟正黑體" panose="020B0604030504040204" pitchFamily="34" charset="-120"/>
+                <a:ea typeface="微軟正黑體" panose="020B0604030504040204" pitchFamily="34" charset="-120"/>
+              </a:rPr>
+              <a:t>Top: synchronous case</a:t>
+            </a:r>
+            <a:endParaRPr lang="zh-TW" altLang="en-US" sz="2000" b="1" dirty="0">
+              <a:latin typeface="微軟正黑體" panose="020B0604030504040204" pitchFamily="34" charset="-120"/>
+              <a:ea typeface="微軟正黑體" panose="020B0604030504040204" pitchFamily="34" charset="-120"/>
+            </a:endParaRPr>
+          </a:p>
+        </p:txBody>
+      </p:sp>
+      <p:sp>
+        <p:nvSpPr>
+          <p:cNvPr id="36" name="文字方塊 35"/>
+          <p:cNvSpPr txBox="1"/>
+          <p:nvPr/>
+        </p:nvSpPr>
+        <p:spPr>
+          <a:xfrm>
+            <a:off x="2843808" y="5333146"/>
+            <a:ext cx="3456384" cy="400110"/>
+          </a:xfrm>
+          <a:prstGeom prst="rect">
+            <a:avLst/>
+          </a:prstGeom>
+          <a:noFill/>
+        </p:spPr>
+        <p:txBody>
+          <a:bodyPr wrap="square" rtlCol="0">
+            <a:spAutoFit/>
+          </a:bodyPr>
+          <a:lstStyle/>
+          <a:p>
+            <a:pPr algn="ctr"/>
+            <a:r>
+              <a:rPr lang="en-US" altLang="zh-TW" sz="2000" b="1" dirty="0" smtClean="0">
+                <a:latin typeface="微軟正黑體" panose="020B0604030504040204" pitchFamily="34" charset="-120"/>
+                <a:ea typeface="微軟正黑體" panose="020B0604030504040204" pitchFamily="34" charset="-120"/>
+              </a:rPr>
+              <a:t>Bottom: async case</a:t>
+            </a:r>
+            <a:endParaRPr lang="zh-TW" altLang="en-US" sz="2000" b="1" dirty="0">
+              <a:latin typeface="微軟正黑體" panose="020B0604030504040204" pitchFamily="34" charset="-120"/>
+              <a:ea typeface="微軟正黑體" panose="020B0604030504040204" pitchFamily="34" charset="-120"/>
+            </a:endParaRPr>
+          </a:p>
+        </p:txBody>
+      </p:sp>
+      <p:sp>
+        <p:nvSpPr>
+          <p:cNvPr id="37" name="矩形 36"/>
+          <p:cNvSpPr/>
+          <p:nvPr/>
+        </p:nvSpPr>
+        <p:spPr>
+          <a:xfrm>
+            <a:off x="3059832" y="908720"/>
+            <a:ext cx="1080120" cy="720080"/>
+          </a:xfrm>
+          <a:prstGeom prst="rect">
+            <a:avLst/>
+          </a:prstGeom>
+        </p:spPr>
+        <p:style>
+          <a:lnRef idx="2">
+            <a:schemeClr val="dk1"/>
+          </a:lnRef>
+          <a:fillRef idx="1">
+            <a:schemeClr val="lt1"/>
+          </a:fillRef>
+          <a:effectRef idx="0">
+            <a:schemeClr val="dk1"/>
+          </a:effectRef>
+          <a:fontRef idx="minor">
+            <a:schemeClr val="dk1"/>
+          </a:fontRef>
+        </p:style>
+        <p:txBody>
+          <a:bodyPr rtlCol="0" anchor="ctr"/>
+          <a:lstStyle/>
+          <a:p>
+            <a:pPr algn="ctr"/>
+            <a:r>
+              <a:rPr lang="en-US" altLang="zh-TW" sz="1600" dirty="0" smtClean="0">
+                <a:latin typeface="微軟正黑體" panose="020B0604030504040204" pitchFamily="34" charset="-120"/>
+                <a:ea typeface="微軟正黑體" panose="020B0604030504040204" pitchFamily="34" charset="-120"/>
+              </a:rPr>
+              <a:t>Display</a:t>
+            </a:r>
+          </a:p>
+          <a:p>
+            <a:pPr algn="ctr"/>
+            <a:r>
+              <a:rPr lang="en-US" altLang="zh-TW" sz="1600" dirty="0" smtClean="0">
+                <a:latin typeface="微軟正黑體" panose="020B0604030504040204" pitchFamily="34" charset="-120"/>
+                <a:ea typeface="微軟正黑體" panose="020B0604030504040204" pitchFamily="34" charset="-120"/>
+              </a:rPr>
+              <a:t>Frame #1</a:t>
+            </a:r>
+            <a:endParaRPr lang="zh-TW" altLang="en-US" sz="1600" dirty="0">
+              <a:latin typeface="微軟正黑體" panose="020B0604030504040204" pitchFamily="34" charset="-120"/>
+              <a:ea typeface="微軟正黑體" panose="020B0604030504040204" pitchFamily="34" charset="-120"/>
+            </a:endParaRPr>
+          </a:p>
+        </p:txBody>
+      </p:sp>
+      <p:sp>
+        <p:nvSpPr>
+          <p:cNvPr id="38" name="矩形 37"/>
+          <p:cNvSpPr/>
+          <p:nvPr/>
+        </p:nvSpPr>
+        <p:spPr>
+          <a:xfrm>
+            <a:off x="5940152" y="908720"/>
+            <a:ext cx="1080120" cy="720080"/>
+          </a:xfrm>
+          <a:prstGeom prst="rect">
+            <a:avLst/>
+          </a:prstGeom>
+        </p:spPr>
+        <p:style>
+          <a:lnRef idx="2">
+            <a:schemeClr val="dk1"/>
+          </a:lnRef>
+          <a:fillRef idx="1">
+            <a:schemeClr val="lt1"/>
+          </a:fillRef>
+          <a:effectRef idx="0">
+            <a:schemeClr val="dk1"/>
+          </a:effectRef>
+          <a:fontRef idx="minor">
+            <a:schemeClr val="dk1"/>
+          </a:fontRef>
+        </p:style>
+        <p:txBody>
+          <a:bodyPr rtlCol="0" anchor="ctr"/>
+          <a:lstStyle/>
+          <a:p>
+            <a:pPr algn="ctr"/>
+            <a:r>
+              <a:rPr lang="en-US" altLang="zh-TW" sz="1600" dirty="0" smtClean="0">
+                <a:latin typeface="微軟正黑體" panose="020B0604030504040204" pitchFamily="34" charset="-120"/>
+                <a:ea typeface="微軟正黑體" panose="020B0604030504040204" pitchFamily="34" charset="-120"/>
+              </a:rPr>
+              <a:t>Display</a:t>
+            </a:r>
+          </a:p>
+          <a:p>
+            <a:pPr algn="ctr"/>
+            <a:r>
+              <a:rPr lang="en-US" altLang="zh-TW" sz="1600" dirty="0" smtClean="0">
+                <a:latin typeface="微軟正黑體" panose="020B0604030504040204" pitchFamily="34" charset="-120"/>
+                <a:ea typeface="微軟正黑體" panose="020B0604030504040204" pitchFamily="34" charset="-120"/>
+              </a:rPr>
+              <a:t>Frame #2</a:t>
+            </a:r>
+            <a:endParaRPr lang="zh-TW" altLang="en-US" sz="1600" dirty="0">
               <a:latin typeface="微軟正黑體" panose="020B0604030504040204" pitchFamily="34" charset="-120"/>
               <a:ea typeface="微軟正黑體" panose="020B0604030504040204" pitchFamily="34" charset="-120"/>
             </a:endParaRPr>

</xml_diff>